<commit_message>
Emphasized the format of returnBody.
</commit_message>
<xml_diff>
--- a/docs/api/overview/up/img/chunked-upload.pptx
+++ b/docs/api/overview/up/img/chunked-upload.pptx
@@ -290,7 +290,7 @@
           <a:p>
             <a:fld id="{881D8425-6142-5542-A55B-2E6ECEFE6DA0}" type="datetimeFigureOut">
               <a:rPr kumimoji="1" lang="zh-CN" altLang="en-US" smtClean="0"/>
-              <a:t>13-11-27</a:t>
+              <a:t>13-12-5</a:t>
             </a:fld>
             <a:endParaRPr kumimoji="1" lang="zh-CN" altLang="en-US"/>
           </a:p>
@@ -460,7 +460,7 @@
           <a:p>
             <a:fld id="{881D8425-6142-5542-A55B-2E6ECEFE6DA0}" type="datetimeFigureOut">
               <a:rPr kumimoji="1" lang="zh-CN" altLang="en-US" smtClean="0"/>
-              <a:t>13-11-27</a:t>
+              <a:t>13-12-5</a:t>
             </a:fld>
             <a:endParaRPr kumimoji="1" lang="zh-CN" altLang="en-US"/>
           </a:p>
@@ -640,7 +640,7 @@
           <a:p>
             <a:fld id="{881D8425-6142-5542-A55B-2E6ECEFE6DA0}" type="datetimeFigureOut">
               <a:rPr kumimoji="1" lang="zh-CN" altLang="en-US" smtClean="0"/>
-              <a:t>13-11-27</a:t>
+              <a:t>13-12-5</a:t>
             </a:fld>
             <a:endParaRPr kumimoji="1" lang="zh-CN" altLang="en-US"/>
           </a:p>
@@ -810,7 +810,7 @@
           <a:p>
             <a:fld id="{881D8425-6142-5542-A55B-2E6ECEFE6DA0}" type="datetimeFigureOut">
               <a:rPr kumimoji="1" lang="zh-CN" altLang="en-US" smtClean="0"/>
-              <a:t>13-11-27</a:t>
+              <a:t>13-12-5</a:t>
             </a:fld>
             <a:endParaRPr kumimoji="1" lang="zh-CN" altLang="en-US"/>
           </a:p>
@@ -1056,7 +1056,7 @@
           <a:p>
             <a:fld id="{881D8425-6142-5542-A55B-2E6ECEFE6DA0}" type="datetimeFigureOut">
               <a:rPr kumimoji="1" lang="zh-CN" altLang="en-US" smtClean="0"/>
-              <a:t>13-11-27</a:t>
+              <a:t>13-12-5</a:t>
             </a:fld>
             <a:endParaRPr kumimoji="1" lang="zh-CN" altLang="en-US"/>
           </a:p>
@@ -1344,7 +1344,7 @@
           <a:p>
             <a:fld id="{881D8425-6142-5542-A55B-2E6ECEFE6DA0}" type="datetimeFigureOut">
               <a:rPr kumimoji="1" lang="zh-CN" altLang="en-US" smtClean="0"/>
-              <a:t>13-11-27</a:t>
+              <a:t>13-12-5</a:t>
             </a:fld>
             <a:endParaRPr kumimoji="1" lang="zh-CN" altLang="en-US"/>
           </a:p>
@@ -1766,7 +1766,7 @@
           <a:p>
             <a:fld id="{881D8425-6142-5542-A55B-2E6ECEFE6DA0}" type="datetimeFigureOut">
               <a:rPr kumimoji="1" lang="zh-CN" altLang="en-US" smtClean="0"/>
-              <a:t>13-11-27</a:t>
+              <a:t>13-12-5</a:t>
             </a:fld>
             <a:endParaRPr kumimoji="1" lang="zh-CN" altLang="en-US"/>
           </a:p>
@@ -1884,7 +1884,7 @@
           <a:p>
             <a:fld id="{881D8425-6142-5542-A55B-2E6ECEFE6DA0}" type="datetimeFigureOut">
               <a:rPr kumimoji="1" lang="zh-CN" altLang="en-US" smtClean="0"/>
-              <a:t>13-11-27</a:t>
+              <a:t>13-12-5</a:t>
             </a:fld>
             <a:endParaRPr kumimoji="1" lang="zh-CN" altLang="en-US"/>
           </a:p>
@@ -1979,7 +1979,7 @@
           <a:p>
             <a:fld id="{881D8425-6142-5542-A55B-2E6ECEFE6DA0}" type="datetimeFigureOut">
               <a:rPr kumimoji="1" lang="zh-CN" altLang="en-US" smtClean="0"/>
-              <a:t>13-11-27</a:t>
+              <a:t>13-12-5</a:t>
             </a:fld>
             <a:endParaRPr kumimoji="1" lang="zh-CN" altLang="en-US"/>
           </a:p>
@@ -2256,7 +2256,7 @@
           <a:p>
             <a:fld id="{881D8425-6142-5542-A55B-2E6ECEFE6DA0}" type="datetimeFigureOut">
               <a:rPr kumimoji="1" lang="zh-CN" altLang="en-US" smtClean="0"/>
-              <a:t>13-11-27</a:t>
+              <a:t>13-12-5</a:t>
             </a:fld>
             <a:endParaRPr kumimoji="1" lang="zh-CN" altLang="en-US"/>
           </a:p>
@@ -2509,7 +2509,7 @@
           <a:p>
             <a:fld id="{881D8425-6142-5542-A55B-2E6ECEFE6DA0}" type="datetimeFigureOut">
               <a:rPr kumimoji="1" lang="zh-CN" altLang="en-US" smtClean="0"/>
-              <a:t>13-11-27</a:t>
+              <a:t>13-12-5</a:t>
             </a:fld>
             <a:endParaRPr kumimoji="1" lang="zh-CN" altLang="en-US"/>
           </a:p>
@@ -2722,7 +2722,7 @@
           <a:p>
             <a:fld id="{881D8425-6142-5542-A55B-2E6ECEFE6DA0}" type="datetimeFigureOut">
               <a:rPr kumimoji="1" lang="zh-CN" altLang="en-US" smtClean="0"/>
-              <a:t>13-11-27</a:t>
+              <a:t>13-12-5</a:t>
             </a:fld>
             <a:endParaRPr kumimoji="1" lang="zh-CN" altLang="en-US"/>
           </a:p>
@@ -5389,15 +5389,7 @@
                 <a:ea typeface="Hei"/>
                 <a:cs typeface="Hei"/>
               </a:rPr>
-              <a:t>将</a:t>
-            </a:r>
-            <a:r>
-              <a:rPr lang="zh-CN" altLang="en-US" dirty="0" smtClean="0">
-                <a:latin typeface="Hei"/>
-                <a:ea typeface="Hei"/>
-                <a:cs typeface="Hei"/>
-              </a:rPr>
-              <a:t>文件分为</a:t>
+              <a:t>将文件分为</a:t>
             </a:r>
             <a:r>
               <a:rPr lang="en-US" altLang="zh-CN" dirty="0" smtClean="0">
@@ -5864,6 +5856,14 @@
               </a:rPr>
               <a:t>mkfile</a:t>
             </a:r>
+            <a:r>
+              <a:rPr lang="zh-CN" altLang="en-US" dirty="0" smtClean="0">
+                <a:latin typeface="Arial"/>
+                <a:ea typeface="Hei"/>
+                <a:cs typeface="Arial"/>
+              </a:rPr>
+              <a:t>创建资源</a:t>
+            </a:r>
             <a:endParaRPr lang="zh-CN" altLang="en-US" dirty="0">
               <a:latin typeface="Arial"/>
               <a:ea typeface="Hei"/>
@@ -5915,11 +5915,6 @@
               </a:rPr>
               <a:t>完成上传</a:t>
             </a:r>
-            <a:endParaRPr lang="zh-CN" altLang="en-US" dirty="0">
-              <a:latin typeface="Hei"/>
-              <a:ea typeface="Hei"/>
-              <a:cs typeface="Hei"/>
-            </a:endParaRPr>
           </a:p>
         </p:txBody>
       </p:sp>
@@ -6174,19 +6169,19 @@
           <p:cNvPr id="43" name="肘形连接符 42"/>
           <p:cNvCxnSpPr>
             <a:stCxn id="19" idx="3"/>
-            <a:endCxn id="8" idx="0"/>
+            <a:endCxn id="7" idx="0"/>
           </p:cNvCxnSpPr>
           <p:nvPr/>
         </p:nvCxnSpPr>
         <p:spPr>
           <a:xfrm flipH="1" flipV="1">
-            <a:off x="4538614" y="2267414"/>
-            <a:ext cx="1611249" cy="2941798"/>
+            <a:off x="4538614" y="1457623"/>
+            <a:ext cx="1611249" cy="3751589"/>
           </a:xfrm>
           <a:prstGeom prst="bentConnector4">
             <a:avLst>
-              <a:gd name="adj1" fmla="val -133014"/>
-              <a:gd name="adj2" fmla="val 105269"/>
+              <a:gd name="adj1" fmla="val -100602"/>
+              <a:gd name="adj2" fmla="val 103646"/>
             </a:avLst>
           </a:prstGeom>
           <a:ln w="28575" cmpd="sng">
@@ -6407,11 +6402,6 @@
               </a:rPr>
               <a:t>块上传子流程</a:t>
             </a:r>
-            <a:endParaRPr kumimoji="1" lang="zh-CN" altLang="en-US" dirty="0" smtClean="0">
-              <a:latin typeface="Hei"/>
-              <a:ea typeface="Hei"/>
-              <a:cs typeface="Hei"/>
-            </a:endParaRPr>
           </a:p>
         </p:txBody>
       </p:sp>

</xml_diff>